<commit_message>
Complete functional test protocol
</commit_message>
<xml_diff>
--- a/validation/03_test/functional/protocol/Illustrations.pptx
+++ b/validation/03_test/functional/protocol/Illustrations.pptx
@@ -3340,10 +3340,10 @@
         </p:nvGrpSpPr>
         <p:grpSpPr>
           <a:xfrm>
-            <a:off x="635285" y="889103"/>
-            <a:ext cx="4286623" cy="3436449"/>
-            <a:chOff x="635285" y="889103"/>
-            <a:chExt cx="4286623" cy="3436449"/>
+            <a:off x="1014179" y="889103"/>
+            <a:ext cx="3907729" cy="3436449"/>
+            <a:chOff x="1014179" y="889103"/>
+            <a:chExt cx="3907729" cy="3436449"/>
           </a:xfrm>
         </p:grpSpPr>
         <p:sp>
@@ -4023,7 +4023,7 @@
           </p:nvSpPr>
           <p:spPr>
             <a:xfrm>
-              <a:off x="635285" y="2211807"/>
+              <a:off x="1014179" y="2211807"/>
               <a:ext cx="807963" cy="309747"/>
             </a:xfrm>
             <a:prstGeom prst="rect">
@@ -4096,8 +4096,8 @@
           </p:nvCxnSpPr>
           <p:spPr>
             <a:xfrm>
-              <a:off x="1443248" y="2366681"/>
-              <a:ext cx="704179" cy="1"/>
+              <a:off x="1822142" y="2366681"/>
+              <a:ext cx="325285" cy="1"/>
             </a:xfrm>
             <a:prstGeom prst="bentConnector3">
               <a:avLst>

</xml_diff>